<commit_message>
small update to .gitignore, and enable content in pptx
</commit_message>
<xml_diff>
--- a/helpsessions/week5/cs150week5.pptx
+++ b/helpsessions/week5/cs150week5.pptx
@@ -220,7 +220,7 @@
           <a:p>
             <a:fld id="{4D7E51A5-B478-1E40-8CBB-0DAA8831E99D}" type="datetimeFigureOut">
               <a:rPr lang="en-US" smtClean="0"/>
-              <a:t>9/20/20</a:t>
+              <a:t>9/21/20</a:t>
             </a:fld>
             <a:endParaRPr lang="en-US"/>
           </a:p>
@@ -385,7 +385,7 @@
           <a:p>
             <a:fld id="{D0ED587F-861E-6740-9643-E3DDAE89B8D6}" type="datetimeFigureOut">
               <a:rPr lang="en-US" smtClean="0"/>
-              <a:t>9/20/20</a:t>
+              <a:t>9/21/20</a:t>
             </a:fld>
             <a:endParaRPr lang="en-US"/>
           </a:p>

</xml_diff>